<commit_message>
commit 6 +saloon image dimensions +main screen text +main screen form
</commit_message>
<xml_diff>
--- a/Gilbert’s Poker Wireframe.pptx
+++ b/Gilbert’s Poker Wireframe.pptx
@@ -261,7 +261,7 @@
           <a:p>
             <a:fld id="{BCC3B7F2-9603-4B04-9E5C-64B9DC04ADBB}" type="datetimeFigureOut">
               <a:rPr lang="en-US" smtClean="0"/>
-              <a:t>5/27/2023</a:t>
+              <a:t>5/29/2023</a:t>
             </a:fld>
             <a:endParaRPr lang="en-US"/>
           </a:p>
@@ -459,7 +459,7 @@
           <a:p>
             <a:fld id="{BCC3B7F2-9603-4B04-9E5C-64B9DC04ADBB}" type="datetimeFigureOut">
               <a:rPr lang="en-US" smtClean="0"/>
-              <a:t>5/27/2023</a:t>
+              <a:t>5/29/2023</a:t>
             </a:fld>
             <a:endParaRPr lang="en-US"/>
           </a:p>
@@ -667,7 +667,7 @@
           <a:p>
             <a:fld id="{BCC3B7F2-9603-4B04-9E5C-64B9DC04ADBB}" type="datetimeFigureOut">
               <a:rPr lang="en-US" smtClean="0"/>
-              <a:t>5/27/2023</a:t>
+              <a:t>5/29/2023</a:t>
             </a:fld>
             <a:endParaRPr lang="en-US"/>
           </a:p>
@@ -865,7 +865,7 @@
           <a:p>
             <a:fld id="{BCC3B7F2-9603-4B04-9E5C-64B9DC04ADBB}" type="datetimeFigureOut">
               <a:rPr lang="en-US" smtClean="0"/>
-              <a:t>5/27/2023</a:t>
+              <a:t>5/29/2023</a:t>
             </a:fld>
             <a:endParaRPr lang="en-US"/>
           </a:p>
@@ -1140,7 +1140,7 @@
           <a:p>
             <a:fld id="{BCC3B7F2-9603-4B04-9E5C-64B9DC04ADBB}" type="datetimeFigureOut">
               <a:rPr lang="en-US" smtClean="0"/>
-              <a:t>5/27/2023</a:t>
+              <a:t>5/29/2023</a:t>
             </a:fld>
             <a:endParaRPr lang="en-US"/>
           </a:p>
@@ -1405,7 +1405,7 @@
           <a:p>
             <a:fld id="{BCC3B7F2-9603-4B04-9E5C-64B9DC04ADBB}" type="datetimeFigureOut">
               <a:rPr lang="en-US" smtClean="0"/>
-              <a:t>5/27/2023</a:t>
+              <a:t>5/29/2023</a:t>
             </a:fld>
             <a:endParaRPr lang="en-US"/>
           </a:p>
@@ -1817,7 +1817,7 @@
           <a:p>
             <a:fld id="{BCC3B7F2-9603-4B04-9E5C-64B9DC04ADBB}" type="datetimeFigureOut">
               <a:rPr lang="en-US" smtClean="0"/>
-              <a:t>5/27/2023</a:t>
+              <a:t>5/29/2023</a:t>
             </a:fld>
             <a:endParaRPr lang="en-US"/>
           </a:p>
@@ -1958,7 +1958,7 @@
           <a:p>
             <a:fld id="{BCC3B7F2-9603-4B04-9E5C-64B9DC04ADBB}" type="datetimeFigureOut">
               <a:rPr lang="en-US" smtClean="0"/>
-              <a:t>5/27/2023</a:t>
+              <a:t>5/29/2023</a:t>
             </a:fld>
             <a:endParaRPr lang="en-US"/>
           </a:p>
@@ -2071,7 +2071,7 @@
           <a:p>
             <a:fld id="{BCC3B7F2-9603-4B04-9E5C-64B9DC04ADBB}" type="datetimeFigureOut">
               <a:rPr lang="en-US" smtClean="0"/>
-              <a:t>5/27/2023</a:t>
+              <a:t>5/29/2023</a:t>
             </a:fld>
             <a:endParaRPr lang="en-US"/>
           </a:p>
@@ -2382,7 +2382,7 @@
           <a:p>
             <a:fld id="{BCC3B7F2-9603-4B04-9E5C-64B9DC04ADBB}" type="datetimeFigureOut">
               <a:rPr lang="en-US" smtClean="0"/>
-              <a:t>5/27/2023</a:t>
+              <a:t>5/29/2023</a:t>
             </a:fld>
             <a:endParaRPr lang="en-US"/>
           </a:p>
@@ -2670,7 +2670,7 @@
           <a:p>
             <a:fld id="{BCC3B7F2-9603-4B04-9E5C-64B9DC04ADBB}" type="datetimeFigureOut">
               <a:rPr lang="en-US" smtClean="0"/>
-              <a:t>5/27/2023</a:t>
+              <a:t>5/29/2023</a:t>
             </a:fld>
             <a:endParaRPr lang="en-US"/>
           </a:p>
@@ -2911,7 +2911,7 @@
           <a:p>
             <a:fld id="{BCC3B7F2-9603-4B04-9E5C-64B9DC04ADBB}" type="datetimeFigureOut">
               <a:rPr lang="en-US" smtClean="0"/>
-              <a:t>5/27/2023</a:t>
+              <a:t>5/29/2023</a:t>
             </a:fld>
             <a:endParaRPr lang="en-US"/>
           </a:p>
@@ -3330,6 +3330,53 @@
       </p:grpSpPr>
       <p:sp>
         <p:nvSpPr>
+          <p:cNvPr id="43" name="Rectangle 42">
+            <a:extLst>
+              <a:ext uri="{FF2B5EF4-FFF2-40B4-BE49-F238E27FC236}">
+                <a16:creationId xmlns:a16="http://schemas.microsoft.com/office/drawing/2014/main" id="{87304CC7-816A-9CE5-7291-48B08B28DCD3}"/>
+              </a:ext>
+            </a:extLst>
+          </p:cNvPr>
+          <p:cNvSpPr/>
+          <p:nvPr/>
+        </p:nvSpPr>
+        <p:spPr>
+          <a:xfrm>
+            <a:off x="822121" y="595618"/>
+            <a:ext cx="1774899" cy="1694576"/>
+          </a:xfrm>
+          <a:prstGeom prst="rect">
+            <a:avLst/>
+          </a:prstGeom>
+          <a:ln>
+            <a:prstDash val="dashDot"/>
+          </a:ln>
+        </p:spPr>
+        <p:style>
+          <a:lnRef idx="2">
+            <a:schemeClr val="dk1"/>
+          </a:lnRef>
+          <a:fillRef idx="1">
+            <a:schemeClr val="lt1"/>
+          </a:fillRef>
+          <a:effectRef idx="0">
+            <a:schemeClr val="dk1"/>
+          </a:effectRef>
+          <a:fontRef idx="minor">
+            <a:schemeClr val="dk1"/>
+          </a:fontRef>
+        </p:style>
+        <p:txBody>
+          <a:bodyPr rtlCol="0" anchor="ctr"/>
+          <a:lstStyle/>
+          <a:p>
+            <a:pPr algn="ctr"/>
+            <a:endParaRPr lang="en-US"/>
+          </a:p>
+        </p:txBody>
+      </p:sp>
+      <p:sp>
+        <p:nvSpPr>
           <p:cNvPr id="2" name="Title 1">
             <a:extLst>
               <a:ext uri="{FF2B5EF4-FFF2-40B4-BE49-F238E27FC236}">
@@ -5248,6 +5295,53 @@
           <a:chExt cx="0" cy="0"/>
         </a:xfrm>
       </p:grpSpPr>
+      <p:sp>
+        <p:nvSpPr>
+          <p:cNvPr id="3" name="Rectangle 2">
+            <a:extLst>
+              <a:ext uri="{FF2B5EF4-FFF2-40B4-BE49-F238E27FC236}">
+                <a16:creationId xmlns:a16="http://schemas.microsoft.com/office/drawing/2014/main" id="{0A67DC44-D426-55AC-5552-8EEE38571180}"/>
+              </a:ext>
+            </a:extLst>
+          </p:cNvPr>
+          <p:cNvSpPr/>
+          <p:nvPr/>
+        </p:nvSpPr>
+        <p:spPr>
+          <a:xfrm>
+            <a:off x="1058795" y="1650534"/>
+            <a:ext cx="1774899" cy="1694576"/>
+          </a:xfrm>
+          <a:prstGeom prst="rect">
+            <a:avLst/>
+          </a:prstGeom>
+          <a:ln>
+            <a:prstDash val="dashDot"/>
+          </a:ln>
+        </p:spPr>
+        <p:style>
+          <a:lnRef idx="2">
+            <a:schemeClr val="dk1"/>
+          </a:lnRef>
+          <a:fillRef idx="1">
+            <a:schemeClr val="lt1"/>
+          </a:fillRef>
+          <a:effectRef idx="0">
+            <a:schemeClr val="dk1"/>
+          </a:effectRef>
+          <a:fontRef idx="minor">
+            <a:schemeClr val="dk1"/>
+          </a:fontRef>
+        </p:style>
+        <p:txBody>
+          <a:bodyPr rtlCol="0" anchor="ctr"/>
+          <a:lstStyle/>
+          <a:p>
+            <a:pPr algn="ctr"/>
+            <a:endParaRPr lang="en-US"/>
+          </a:p>
+        </p:txBody>
+      </p:sp>
       <p:sp>
         <p:nvSpPr>
           <p:cNvPr id="2" name="Title 1">
@@ -5979,6 +6073,53 @@
           <a:chExt cx="0" cy="0"/>
         </a:xfrm>
       </p:grpSpPr>
+      <p:sp>
+        <p:nvSpPr>
+          <p:cNvPr id="19" name="Rectangle 18">
+            <a:extLst>
+              <a:ext uri="{FF2B5EF4-FFF2-40B4-BE49-F238E27FC236}">
+                <a16:creationId xmlns:a16="http://schemas.microsoft.com/office/drawing/2014/main" id="{828DEE42-E16D-B23B-C8EC-BC635A79EE49}"/>
+              </a:ext>
+            </a:extLst>
+          </p:cNvPr>
+          <p:cNvSpPr/>
+          <p:nvPr/>
+        </p:nvSpPr>
+        <p:spPr>
+          <a:xfrm>
+            <a:off x="852217" y="654341"/>
+            <a:ext cx="1774899" cy="1694576"/>
+          </a:xfrm>
+          <a:prstGeom prst="rect">
+            <a:avLst/>
+          </a:prstGeom>
+          <a:ln>
+            <a:prstDash val="dashDot"/>
+          </a:ln>
+        </p:spPr>
+        <p:style>
+          <a:lnRef idx="2">
+            <a:schemeClr val="dk1"/>
+          </a:lnRef>
+          <a:fillRef idx="1">
+            <a:schemeClr val="lt1"/>
+          </a:fillRef>
+          <a:effectRef idx="0">
+            <a:schemeClr val="dk1"/>
+          </a:effectRef>
+          <a:fontRef idx="minor">
+            <a:schemeClr val="dk1"/>
+          </a:fontRef>
+        </p:style>
+        <p:txBody>
+          <a:bodyPr rtlCol="0" anchor="ctr"/>
+          <a:lstStyle/>
+          <a:p>
+            <a:pPr algn="ctr"/>
+            <a:endParaRPr lang="en-US"/>
+          </a:p>
+        </p:txBody>
+      </p:sp>
       <p:sp>
         <p:nvSpPr>
           <p:cNvPr id="2" name="Title 1">

</xml_diff>